<commit_message>
Add note on reactive manifesto
</commit_message>
<xml_diff>
--- a/2016-06_AkkaIntro/presentation/BaltoMSDN_Akka.pptx
+++ b/2016-06_AkkaIntro/presentation/BaltoMSDN_Akka.pptx
@@ -253,7 +253,7 @@
           <a:p>
             <a:fld id="{6335B490-DE02-4CC7-B66C-CADF953C8E73}" type="datetimeFigureOut">
               <a:rPr lang="en-US" smtClean="0"/>
-              <a:t>6/14/2016</a:t>
+              <a:t>6/15/2016</a:t>
             </a:fld>
             <a:endParaRPr lang="en-US"/>
           </a:p>
@@ -6664,6 +6664,117 @@
               </a:rPr>
               <a:t>Remact.Net</a:t>
             </a:r>
+            <a:endParaRPr lang="en-US" sz="1200" b="0" i="0" kern="1200" dirty="0">
+              <a:solidFill>
+                <a:schemeClr val="tx1"/>
+              </a:solidFill>
+              <a:effectLst/>
+              <a:latin typeface="+mn-lt"/>
+              <a:ea typeface="+mn-ea"/>
+              <a:cs typeface="+mn-cs"/>
+            </a:endParaRPr>
+          </a:p>
+          <a:p>
+            <a:pPr marL="171450" lvl="0" indent="-171450" rtl="0" fontAlgn="ctr">
+              <a:buFont typeface="Arial" panose="020B0604020202020204" pitchFamily="34" charset="0"/>
+              <a:buChar char="•"/>
+            </a:pPr>
+            <a:r>
+              <a:rPr lang="en-US" sz="1400" b="0" i="0" kern="1200" dirty="0">
+                <a:solidFill>
+                  <a:schemeClr val="tx1"/>
+                </a:solidFill>
+                <a:effectLst/>
+                <a:latin typeface="+mn-lt"/>
+                <a:ea typeface="+mn-ea"/>
+                <a:cs typeface="+mn-cs"/>
+              </a:rPr>
+              <a:t>Akka.NET</a:t>
+            </a:r>
+            <a:r>
+              <a:rPr lang="en-US" sz="1400" b="0" i="0" kern="1200" baseline="0" dirty="0">
+                <a:solidFill>
+                  <a:schemeClr val="tx1"/>
+                </a:solidFill>
+                <a:effectLst/>
+                <a:latin typeface="+mn-lt"/>
+                <a:ea typeface="+mn-ea"/>
+                <a:cs typeface="+mn-cs"/>
+              </a:rPr>
+              <a:t> Aims to adhere to the reactive manifesto</a:t>
+            </a:r>
+          </a:p>
+          <a:p>
+            <a:pPr marL="628650" lvl="1" indent="-171450" rtl="0" fontAlgn="ctr">
+              <a:buFont typeface="Arial" panose="020B0604020202020204" pitchFamily="34" charset="0"/>
+              <a:buChar char="•"/>
+            </a:pPr>
+            <a:r>
+              <a:rPr lang="en-US" sz="1400" b="0" i="0" kern="1200" baseline="0" dirty="0">
+                <a:solidFill>
+                  <a:schemeClr val="tx1"/>
+                </a:solidFill>
+                <a:effectLst/>
+                <a:latin typeface="+mn-lt"/>
+                <a:ea typeface="+mn-ea"/>
+                <a:cs typeface="+mn-cs"/>
+              </a:rPr>
+              <a:t>Responsive</a:t>
+            </a:r>
+          </a:p>
+          <a:p>
+            <a:pPr marL="628650" lvl="1" indent="-171450" rtl="0" fontAlgn="ctr">
+              <a:buFont typeface="Arial" panose="020B0604020202020204" pitchFamily="34" charset="0"/>
+              <a:buChar char="•"/>
+            </a:pPr>
+            <a:r>
+              <a:rPr lang="en-US" sz="1400" b="0" i="0" kern="1200" baseline="0" dirty="0">
+                <a:solidFill>
+                  <a:schemeClr val="tx1"/>
+                </a:solidFill>
+                <a:effectLst/>
+                <a:latin typeface="+mn-lt"/>
+                <a:ea typeface="+mn-ea"/>
+                <a:cs typeface="+mn-cs"/>
+              </a:rPr>
+              <a:t>Resilient (e.g. self-healing)</a:t>
+            </a:r>
+          </a:p>
+          <a:p>
+            <a:pPr marL="628650" lvl="1" indent="-171450" rtl="0" fontAlgn="ctr">
+              <a:buFont typeface="Arial" panose="020B0604020202020204" pitchFamily="34" charset="0"/>
+              <a:buChar char="•"/>
+            </a:pPr>
+            <a:r>
+              <a:rPr lang="en-US" sz="1400" b="0" i="0" kern="1200" baseline="0" dirty="0">
+                <a:solidFill>
+                  <a:schemeClr val="tx1"/>
+                </a:solidFill>
+                <a:effectLst/>
+                <a:latin typeface="+mn-lt"/>
+                <a:ea typeface="+mn-ea"/>
+                <a:cs typeface="+mn-cs"/>
+              </a:rPr>
+              <a:t>Elastic</a:t>
+            </a:r>
+          </a:p>
+          <a:p>
+            <a:pPr marL="628650" lvl="1" indent="-171450" rtl="0" fontAlgn="ctr">
+              <a:buFont typeface="Arial" panose="020B0604020202020204" pitchFamily="34" charset="0"/>
+              <a:buChar char="•"/>
+            </a:pPr>
+            <a:r>
+              <a:rPr lang="en-US" sz="1400" b="0" i="0" kern="1200" baseline="0">
+                <a:solidFill>
+                  <a:schemeClr val="tx1"/>
+                </a:solidFill>
+                <a:effectLst/>
+                <a:latin typeface="+mn-lt"/>
+                <a:ea typeface="+mn-ea"/>
+                <a:cs typeface="+mn-cs"/>
+              </a:rPr>
+              <a:t>Message driven</a:t>
+            </a:r>
             <a:endParaRPr lang="en-US" sz="1400" b="0" i="0" kern="1200" dirty="0">
               <a:solidFill>
                 <a:schemeClr val="tx1"/>
@@ -6858,7 +6969,7 @@
           <a:p>
             <a:fld id="{4AAD347D-5ACD-4C99-B74B-A9C85AD731AF}" type="datetimeFigureOut">
               <a:rPr lang="en-US" smtClean="0"/>
-              <a:t>6/14/2016</a:t>
+              <a:t>6/15/2016</a:t>
             </a:fld>
             <a:endParaRPr lang="en-US" dirty="0"/>
           </a:p>
@@ -7110,7 +7221,7 @@
           <a:p>
             <a:fld id="{4509A250-FF31-4206-8172-F9D3106AACB1}" type="datetimeFigureOut">
               <a:rPr lang="en-US" smtClean="0"/>
-              <a:t>6/14/2016</a:t>
+              <a:t>6/15/2016</a:t>
             </a:fld>
             <a:endParaRPr lang="en-US" dirty="0"/>
           </a:p>
@@ -7278,7 +7389,7 @@
           <a:p>
             <a:fld id="{4509A250-FF31-4206-8172-F9D3106AACB1}" type="datetimeFigureOut">
               <a:rPr lang="en-US" smtClean="0"/>
-              <a:t>6/14/2016</a:t>
+              <a:t>6/15/2016</a:t>
             </a:fld>
             <a:endParaRPr lang="en-US" dirty="0"/>
           </a:p>
@@ -7456,7 +7567,7 @@
           <a:p>
             <a:fld id="{4509A250-FF31-4206-8172-F9D3106AACB1}" type="datetimeFigureOut">
               <a:rPr lang="en-US" smtClean="0"/>
-              <a:t>6/14/2016</a:t>
+              <a:t>6/15/2016</a:t>
             </a:fld>
             <a:endParaRPr lang="en-US" dirty="0"/>
           </a:p>
@@ -8518,7 +8629,7 @@
           <a:p>
             <a:fld id="{4509A250-FF31-4206-8172-F9D3106AACB1}" type="datetimeFigureOut">
               <a:rPr lang="en-US" smtClean="0"/>
-              <a:t>6/14/2016</a:t>
+              <a:t>6/15/2016</a:t>
             </a:fld>
             <a:endParaRPr lang="en-US" dirty="0"/>
           </a:p>
@@ -8679,7 +8790,7 @@
           <a:p>
             <a:fld id="{4AAD347D-5ACD-4C99-B74B-A9C85AD731AF}" type="datetimeFigureOut">
               <a:rPr lang="en-US" smtClean="0"/>
-              <a:t>6/14/2016</a:t>
+              <a:t>6/15/2016</a:t>
             </a:fld>
             <a:endParaRPr lang="en-US" dirty="0"/>
           </a:p>
@@ -8954,7 +9065,7 @@
           <a:p>
             <a:fld id="{9796027F-7875-4030-9381-8BD8C4F21935}" type="datetimeFigureOut">
               <a:rPr lang="en-US" smtClean="0"/>
-              <a:t>6/14/2016</a:t>
+              <a:t>6/15/2016</a:t>
             </a:fld>
             <a:endParaRPr lang="en-US" dirty="0"/>
           </a:p>
@@ -9183,7 +9294,7 @@
           <a:p>
             <a:fld id="{9796027F-7875-4030-9381-8BD8C4F21935}" type="datetimeFigureOut">
               <a:rPr lang="en-US" smtClean="0"/>
-              <a:t>6/14/2016</a:t>
+              <a:t>6/15/2016</a:t>
             </a:fld>
             <a:endParaRPr lang="en-US" dirty="0"/>
           </a:p>
@@ -9547,7 +9658,7 @@
           <a:p>
             <a:fld id="{9796027F-7875-4030-9381-8BD8C4F21935}" type="datetimeFigureOut">
               <a:rPr lang="en-US" smtClean="0"/>
-              <a:t>6/14/2016</a:t>
+              <a:t>6/15/2016</a:t>
             </a:fld>
             <a:endParaRPr lang="en-US" dirty="0"/>
           </a:p>
@@ -9664,7 +9775,7 @@
           <a:p>
             <a:fld id="{4509A250-FF31-4206-8172-F9D3106AACB1}" type="datetimeFigureOut">
               <a:rPr lang="en-US" smtClean="0"/>
-              <a:t>6/14/2016</a:t>
+              <a:t>6/15/2016</a:t>
             </a:fld>
             <a:endParaRPr lang="en-US" dirty="0"/>
           </a:p>
@@ -9759,7 +9870,7 @@
           <a:p>
             <a:fld id="{4509A250-FF31-4206-8172-F9D3106AACB1}" type="datetimeFigureOut">
               <a:rPr lang="en-US" smtClean="0"/>
-              <a:t>6/14/2016</a:t>
+              <a:t>6/15/2016</a:t>
             </a:fld>
             <a:endParaRPr lang="en-US" dirty="0"/>
           </a:p>
@@ -10034,7 +10145,7 @@
           <a:p>
             <a:fld id="{4509A250-FF31-4206-8172-F9D3106AACB1}" type="datetimeFigureOut">
               <a:rPr lang="en-US" smtClean="0"/>
-              <a:t>6/14/2016</a:t>
+              <a:t>6/15/2016</a:t>
             </a:fld>
             <a:endParaRPr lang="en-US" dirty="0"/>
           </a:p>
@@ -10248,7 +10359,7 @@
           <a:p>
             <a:fld id="{4AAD347D-5ACD-4C99-B74B-A9C85AD731AF}" type="datetimeFigureOut">
               <a:rPr lang="en-US" smtClean="0"/>
-              <a:t>6/14/2016</a:t>
+              <a:t>6/15/2016</a:t>
             </a:fld>
             <a:endParaRPr lang="en-US" dirty="0"/>
           </a:p>

</xml_diff>

<commit_message>
Add shortened URL to presentation
points to master branch. I hate URL shorteners but it's a quick fix.
</commit_message>
<xml_diff>
--- a/2016-06_AkkaIntro/presentation/BaltoMSDN_Akka.pptx
+++ b/2016-06_AkkaIntro/presentation/BaltoMSDN_Akka.pptx
@@ -6764,7 +6764,7 @@
               <a:buChar char="•"/>
             </a:pPr>
             <a:r>
-              <a:rPr lang="en-US" sz="1400" b="0" i="0" kern="1200" baseline="0">
+              <a:rPr lang="en-US" sz="1400" b="0" i="0" kern="1200" baseline="0" dirty="0">
                 <a:solidFill>
                   <a:schemeClr val="tx1"/>
                 </a:solidFill>
@@ -10864,6 +10864,202 @@
           </a:prstGeom>
         </p:spPr>
       </p:pic>
+      <p:sp>
+        <p:nvSpPr>
+          <p:cNvPr id="6" name="Subtitle 2"/>
+          <p:cNvSpPr txBox="1">
+            <a:spLocks/>
+          </p:cNvSpPr>
+          <p:nvPr/>
+        </p:nvSpPr>
+        <p:spPr>
+          <a:xfrm>
+            <a:off x="2517231" y="1633079"/>
+            <a:ext cx="7157536" cy="1655762"/>
+          </a:xfrm>
+          <a:prstGeom prst="rect">
+            <a:avLst/>
+          </a:prstGeom>
+        </p:spPr>
+        <p:txBody>
+          <a:bodyPr vert="horz" lIns="91440" tIns="45720" rIns="91440" bIns="45720" rtlCol="0">
+            <a:normAutofit/>
+          </a:bodyPr>
+          <a:lstStyle>
+            <a:lvl1pPr marL="0" indent="0" algn="ctr" defTabSz="914400" rtl="0" eaLnBrk="1" latinLnBrk="0" hangingPunct="1">
+              <a:lnSpc>
+                <a:spcPct val="90000"/>
+              </a:lnSpc>
+              <a:spcBef>
+                <a:spcPts val="1000"/>
+              </a:spcBef>
+              <a:buFont typeface="Arial" panose="020B0604020202020204" pitchFamily="34" charset="0"/>
+              <a:buNone/>
+              <a:defRPr sz="2400" kern="1200">
+                <a:solidFill>
+                  <a:schemeClr val="tx1"/>
+                </a:solidFill>
+                <a:latin typeface="+mn-lt"/>
+                <a:ea typeface="+mn-ea"/>
+                <a:cs typeface="+mn-cs"/>
+              </a:defRPr>
+            </a:lvl1pPr>
+            <a:lvl2pPr marL="457200" indent="0" algn="ctr" defTabSz="914400" rtl="0" eaLnBrk="1" latinLnBrk="0" hangingPunct="1">
+              <a:lnSpc>
+                <a:spcPct val="90000"/>
+              </a:lnSpc>
+              <a:spcBef>
+                <a:spcPts val="500"/>
+              </a:spcBef>
+              <a:buFont typeface="Arial" panose="020B0604020202020204" pitchFamily="34" charset="0"/>
+              <a:buNone/>
+              <a:defRPr sz="2000" kern="1200">
+                <a:solidFill>
+                  <a:schemeClr val="tx1"/>
+                </a:solidFill>
+                <a:latin typeface="+mn-lt"/>
+                <a:ea typeface="+mn-ea"/>
+                <a:cs typeface="+mn-cs"/>
+              </a:defRPr>
+            </a:lvl2pPr>
+            <a:lvl3pPr marL="914400" indent="0" algn="ctr" defTabSz="914400" rtl="0" eaLnBrk="1" latinLnBrk="0" hangingPunct="1">
+              <a:lnSpc>
+                <a:spcPct val="90000"/>
+              </a:lnSpc>
+              <a:spcBef>
+                <a:spcPts val="500"/>
+              </a:spcBef>
+              <a:buFont typeface="Arial" panose="020B0604020202020204" pitchFamily="34" charset="0"/>
+              <a:buNone/>
+              <a:defRPr sz="1800" kern="1200">
+                <a:solidFill>
+                  <a:schemeClr val="tx1"/>
+                </a:solidFill>
+                <a:latin typeface="+mn-lt"/>
+                <a:ea typeface="+mn-ea"/>
+                <a:cs typeface="+mn-cs"/>
+              </a:defRPr>
+            </a:lvl3pPr>
+            <a:lvl4pPr marL="1371600" indent="0" algn="ctr" defTabSz="914400" rtl="0" eaLnBrk="1" latinLnBrk="0" hangingPunct="1">
+              <a:lnSpc>
+                <a:spcPct val="90000"/>
+              </a:lnSpc>
+              <a:spcBef>
+                <a:spcPts val="500"/>
+              </a:spcBef>
+              <a:buFont typeface="Arial" panose="020B0604020202020204" pitchFamily="34" charset="0"/>
+              <a:buNone/>
+              <a:defRPr sz="1600" kern="1200">
+                <a:solidFill>
+                  <a:schemeClr val="tx1"/>
+                </a:solidFill>
+                <a:latin typeface="+mn-lt"/>
+                <a:ea typeface="+mn-ea"/>
+                <a:cs typeface="+mn-cs"/>
+              </a:defRPr>
+            </a:lvl4pPr>
+            <a:lvl5pPr marL="1828800" indent="0" algn="ctr" defTabSz="914400" rtl="0" eaLnBrk="1" latinLnBrk="0" hangingPunct="1">
+              <a:lnSpc>
+                <a:spcPct val="90000"/>
+              </a:lnSpc>
+              <a:spcBef>
+                <a:spcPts val="500"/>
+              </a:spcBef>
+              <a:buFont typeface="Arial" panose="020B0604020202020204" pitchFamily="34" charset="0"/>
+              <a:buNone/>
+              <a:defRPr sz="1600" kern="1200">
+                <a:solidFill>
+                  <a:schemeClr val="tx1"/>
+                </a:solidFill>
+                <a:latin typeface="+mn-lt"/>
+                <a:ea typeface="+mn-ea"/>
+                <a:cs typeface="+mn-cs"/>
+              </a:defRPr>
+            </a:lvl5pPr>
+            <a:lvl6pPr marL="2286000" indent="0" algn="ctr" defTabSz="914400" rtl="0" eaLnBrk="1" latinLnBrk="0" hangingPunct="1">
+              <a:lnSpc>
+                <a:spcPct val="90000"/>
+              </a:lnSpc>
+              <a:spcBef>
+                <a:spcPts val="500"/>
+              </a:spcBef>
+              <a:buFont typeface="Arial" panose="020B0604020202020204" pitchFamily="34" charset="0"/>
+              <a:buNone/>
+              <a:defRPr sz="1600" kern="1200">
+                <a:solidFill>
+                  <a:schemeClr val="tx1"/>
+                </a:solidFill>
+                <a:latin typeface="+mn-lt"/>
+                <a:ea typeface="+mn-ea"/>
+                <a:cs typeface="+mn-cs"/>
+              </a:defRPr>
+            </a:lvl6pPr>
+            <a:lvl7pPr marL="2743200" indent="0" algn="ctr" defTabSz="914400" rtl="0" eaLnBrk="1" latinLnBrk="0" hangingPunct="1">
+              <a:lnSpc>
+                <a:spcPct val="90000"/>
+              </a:lnSpc>
+              <a:spcBef>
+                <a:spcPts val="500"/>
+              </a:spcBef>
+              <a:buFont typeface="Arial" panose="020B0604020202020204" pitchFamily="34" charset="0"/>
+              <a:buNone/>
+              <a:defRPr sz="1600" kern="1200">
+                <a:solidFill>
+                  <a:schemeClr val="tx1"/>
+                </a:solidFill>
+                <a:latin typeface="+mn-lt"/>
+                <a:ea typeface="+mn-ea"/>
+                <a:cs typeface="+mn-cs"/>
+              </a:defRPr>
+            </a:lvl7pPr>
+            <a:lvl8pPr marL="3200400" indent="0" algn="ctr" defTabSz="914400" rtl="0" eaLnBrk="1" latinLnBrk="0" hangingPunct="1">
+              <a:lnSpc>
+                <a:spcPct val="90000"/>
+              </a:lnSpc>
+              <a:spcBef>
+                <a:spcPts val="500"/>
+              </a:spcBef>
+              <a:buFont typeface="Arial" panose="020B0604020202020204" pitchFamily="34" charset="0"/>
+              <a:buNone/>
+              <a:defRPr sz="1600" kern="1200">
+                <a:solidFill>
+                  <a:schemeClr val="tx1"/>
+                </a:solidFill>
+                <a:latin typeface="+mn-lt"/>
+                <a:ea typeface="+mn-ea"/>
+                <a:cs typeface="+mn-cs"/>
+              </a:defRPr>
+            </a:lvl8pPr>
+            <a:lvl9pPr marL="3657600" indent="0" algn="ctr" defTabSz="914400" rtl="0" eaLnBrk="1" latinLnBrk="0" hangingPunct="1">
+              <a:lnSpc>
+                <a:spcPct val="90000"/>
+              </a:lnSpc>
+              <a:spcBef>
+                <a:spcPts val="500"/>
+              </a:spcBef>
+              <a:buFont typeface="Arial" panose="020B0604020202020204" pitchFamily="34" charset="0"/>
+              <a:buNone/>
+              <a:defRPr sz="1600" kern="1200">
+                <a:solidFill>
+                  <a:schemeClr val="tx1"/>
+                </a:solidFill>
+                <a:latin typeface="+mn-lt"/>
+                <a:ea typeface="+mn-ea"/>
+                <a:cs typeface="+mn-cs"/>
+              </a:defRPr>
+            </a:lvl9pPr>
+          </a:lstStyle>
+          <a:p>
+            <a:r>
+              <a:rPr lang="en-US" sz="4000" dirty="0">
+                <a:hlinkClick r:id="rId4"/>
+              </a:rPr>
+              <a:t>http://bit.do/SK_Akka_June2016</a:t>
+            </a:r>
+            <a:endParaRPr lang="en-US" sz="4000" dirty="0"/>
+          </a:p>
+        </p:txBody>
+      </p:sp>
     </p:spTree>
     <p:extLst>
       <p:ext uri="{BB962C8B-B14F-4D97-AF65-F5344CB8AC3E}">

</xml_diff>

<commit_message>
Add outtro slide with contact info
</commit_message>
<xml_diff>
--- a/2016-06_AkkaIntro/presentation/BaltoMSDN_Akka.pptx
+++ b/2016-06_AkkaIntro/presentation/BaltoMSDN_Akka.pptx
@@ -5,7 +5,7 @@
     <p:sldMasterId id="2147483672" r:id="rId1"/>
   </p:sldMasterIdLst>
   <p:notesMasterIdLst>
-    <p:notesMasterId r:id="rId41"/>
+    <p:notesMasterId r:id="rId42"/>
   </p:notesMasterIdLst>
   <p:sldIdLst>
     <p:sldId id="256" r:id="rId2"/>
@@ -46,7 +46,8 @@
     <p:sldId id="281" r:id="rId37"/>
     <p:sldId id="313" r:id="rId38"/>
     <p:sldId id="282" r:id="rId39"/>
-    <p:sldId id="283" r:id="rId40"/>
+    <p:sldId id="320" r:id="rId40"/>
+    <p:sldId id="321" r:id="rId41"/>
   </p:sldIdLst>
   <p:sldSz cx="12192000" cy="6858000"/>
   <p:notesSz cx="6858000" cy="9144000"/>
@@ -6196,6 +6197,85 @@
           <a:bodyPr/>
           <a:lstStyle/>
           <a:p>
+            <a:pPr marL="0" marR="0" lvl="0" indent="0" algn="l" defTabSz="914400" rtl="0" eaLnBrk="1" fontAlgn="auto" latinLnBrk="0" hangingPunct="1">
+              <a:lnSpc>
+                <a:spcPct val="100000"/>
+              </a:lnSpc>
+              <a:spcBef>
+                <a:spcPts val="0"/>
+              </a:spcBef>
+              <a:spcAft>
+                <a:spcPts val="0"/>
+              </a:spcAft>
+              <a:buClrTx/>
+              <a:buSzTx/>
+              <a:buFontTx/>
+              <a:buNone/>
+              <a:tabLst/>
+              <a:defRPr/>
+            </a:pPr>
+            <a:r>
+              <a:rPr lang="en-US" sz="1200" b="0" i="0" kern="1200" dirty="0">
+                <a:solidFill>
+                  <a:schemeClr val="tx1"/>
+                </a:solidFill>
+                <a:effectLst/>
+                <a:latin typeface="+mn-lt"/>
+                <a:ea typeface="+mn-ea"/>
+                <a:cs typeface="+mn-cs"/>
+              </a:rPr>
+              <a:t>Met at .</a:t>
+            </a:r>
+            <a:r>
+              <a:rPr lang="en-US" sz="1200" b="0" i="0" kern="1200" dirty="0" err="1">
+                <a:solidFill>
+                  <a:schemeClr val="tx1"/>
+                </a:solidFill>
+                <a:effectLst/>
+                <a:latin typeface="+mn-lt"/>
+                <a:ea typeface="+mn-ea"/>
+                <a:cs typeface="+mn-cs"/>
+              </a:rPr>
+              <a:t>NetFringe</a:t>
+            </a:r>
+            <a:r>
+              <a:rPr lang="en-US" sz="1200" b="0" i="0" kern="1200" dirty="0">
+                <a:solidFill>
+                  <a:schemeClr val="tx1"/>
+                </a:solidFill>
+                <a:effectLst/>
+                <a:latin typeface="+mn-lt"/>
+                <a:ea typeface="+mn-ea"/>
+                <a:cs typeface="+mn-cs"/>
+              </a:rPr>
+              <a:t> in PDX (Akka.NET all day workshop with Aaron &amp; Andrew from </a:t>
+            </a:r>
+            <a:r>
+              <a:rPr lang="en-US" sz="1200" b="0" i="0" kern="1200" dirty="0" err="1">
+                <a:solidFill>
+                  <a:schemeClr val="tx1"/>
+                </a:solidFill>
+                <a:effectLst/>
+                <a:latin typeface="+mn-lt"/>
+                <a:ea typeface="+mn-ea"/>
+                <a:cs typeface="+mn-cs"/>
+              </a:rPr>
+              <a:t>Petabridge</a:t>
+            </a:r>
+            <a:r>
+              <a:rPr lang="en-US" sz="1200" b="0" i="0" kern="1200" dirty="0">
+                <a:solidFill>
+                  <a:schemeClr val="tx1"/>
+                </a:solidFill>
+                <a:effectLst/>
+                <a:latin typeface="+mn-lt"/>
+                <a:ea typeface="+mn-ea"/>
+                <a:cs typeface="+mn-cs"/>
+              </a:rPr>
+              <a:t>)</a:t>
+            </a:r>
+          </a:p>
+          <a:p>
             <a:endParaRPr lang="en-US" dirty="0"/>
           </a:p>
         </p:txBody>
@@ -6226,7 +6306,7 @@
     </p:spTree>
     <p:extLst>
       <p:ext uri="{BB962C8B-B14F-4D97-AF65-F5344CB8AC3E}">
-        <p14:creationId xmlns:p14="http://schemas.microsoft.com/office/powerpoint/2010/main" val="751814506"/>
+        <p14:creationId xmlns:p14="http://schemas.microsoft.com/office/powerpoint/2010/main" val="2935918185"/>
       </p:ext>
     </p:extLst>
   </p:cSld>
@@ -6337,6 +6417,90 @@
     <p:extLst>
       <p:ext uri="{BB962C8B-B14F-4D97-AF65-F5344CB8AC3E}">
         <p14:creationId xmlns:p14="http://schemas.microsoft.com/office/powerpoint/2010/main" val="3570458093"/>
+      </p:ext>
+    </p:extLst>
+  </p:cSld>
+  <p:clrMapOvr>
+    <a:masterClrMapping/>
+  </p:clrMapOvr>
+</p:notes>
+</file>
+
+<file path=ppt/notesSlides/notesSlide40.xml><?xml version="1.0" encoding="utf-8"?>
+<p:notes xmlns:a="http://schemas.openxmlformats.org/drawingml/2006/main" xmlns:r="http://schemas.openxmlformats.org/officeDocument/2006/relationships" xmlns:p="http://schemas.openxmlformats.org/presentationml/2006/main">
+  <p:cSld>
+    <p:spTree>
+      <p:nvGrpSpPr>
+        <p:cNvPr id="1" name=""/>
+        <p:cNvGrpSpPr/>
+        <p:nvPr/>
+      </p:nvGrpSpPr>
+      <p:grpSpPr>
+        <a:xfrm>
+          <a:off x="0" y="0"/>
+          <a:ext cx="0" cy="0"/>
+          <a:chOff x="0" y="0"/>
+          <a:chExt cx="0" cy="0"/>
+        </a:xfrm>
+      </p:grpSpPr>
+      <p:sp>
+        <p:nvSpPr>
+          <p:cNvPr id="2" name="Slide Image Placeholder 1"/>
+          <p:cNvSpPr>
+            <a:spLocks noGrp="1" noRot="1" noChangeAspect="1"/>
+          </p:cNvSpPr>
+          <p:nvPr>
+            <p:ph type="sldImg"/>
+          </p:nvPr>
+        </p:nvSpPr>
+        <p:spPr/>
+      </p:sp>
+      <p:sp>
+        <p:nvSpPr>
+          <p:cNvPr id="3" name="Notes Placeholder 2"/>
+          <p:cNvSpPr>
+            <a:spLocks noGrp="1"/>
+          </p:cNvSpPr>
+          <p:nvPr>
+            <p:ph type="body" idx="1"/>
+          </p:nvPr>
+        </p:nvSpPr>
+        <p:spPr/>
+        <p:txBody>
+          <a:bodyPr/>
+          <a:lstStyle/>
+          <a:p>
+            <a:endParaRPr lang="en-US" dirty="0"/>
+          </a:p>
+        </p:txBody>
+      </p:sp>
+      <p:sp>
+        <p:nvSpPr>
+          <p:cNvPr id="4" name="Slide Number Placeholder 3"/>
+          <p:cNvSpPr>
+            <a:spLocks noGrp="1"/>
+          </p:cNvSpPr>
+          <p:nvPr>
+            <p:ph type="sldNum" sz="quarter" idx="10"/>
+          </p:nvPr>
+        </p:nvSpPr>
+        <p:spPr/>
+        <p:txBody>
+          <a:bodyPr/>
+          <a:lstStyle/>
+          <a:p>
+            <a:fld id="{D4C47EB6-B919-4FB3-9341-FE04BD40B358}" type="slidenum">
+              <a:rPr lang="en-US" smtClean="0"/>
+              <a:t>40</a:t>
+            </a:fld>
+            <a:endParaRPr lang="en-US"/>
+          </a:p>
+        </p:txBody>
+      </p:sp>
+    </p:spTree>
+    <p:extLst>
+      <p:ext uri="{BB962C8B-B14F-4D97-AF65-F5344CB8AC3E}">
+        <p14:creationId xmlns:p14="http://schemas.microsoft.com/office/powerpoint/2010/main" val="210412100"/>
       </p:ext>
     </p:extLst>
   </p:cSld>
@@ -41941,15 +42105,188 @@
           <a:p>
             <a:r>
               <a:rPr lang="en-US" dirty="0"/>
-              <a:t>Thanks!</a:t>
-            </a:r>
+              <a:t>Thanks -- Stay in Touch!</a:t>
+            </a:r>
+          </a:p>
+        </p:txBody>
+      </p:sp>
+      <p:pic>
+        <p:nvPicPr>
+          <p:cNvPr id="6" name="Content Placeholder 5"/>
+          <p:cNvPicPr>
+            <a:picLocks noGrp="1" noChangeAspect="1"/>
+          </p:cNvPicPr>
+          <p:nvPr>
+            <p:ph sz="half" idx="1"/>
+          </p:nvPr>
+        </p:nvPicPr>
+        <p:blipFill>
+          <a:blip r:embed="rId3"/>
+          <a:stretch>
+            <a:fillRect/>
+          </a:stretch>
+        </p:blipFill>
+        <p:spPr>
+          <a:xfrm>
+            <a:off x="984074" y="1690688"/>
+            <a:ext cx="3768548" cy="3768548"/>
+          </a:xfrm>
+        </p:spPr>
+      </p:pic>
+      <p:sp>
+        <p:nvSpPr>
+          <p:cNvPr id="5" name="Content Placeholder 4"/>
+          <p:cNvSpPr>
+            <a:spLocks noGrp="1"/>
+          </p:cNvSpPr>
+          <p:nvPr>
+            <p:ph sz="half" idx="2"/>
+          </p:nvPr>
+        </p:nvSpPr>
+        <p:spPr>
+          <a:xfrm>
+            <a:off x="5600700" y="1690688"/>
+            <a:ext cx="5290255" cy="4351338"/>
+          </a:xfrm>
+        </p:spPr>
+        <p:txBody>
+          <a:bodyPr/>
+          <a:lstStyle/>
+          <a:p>
+            <a:pPr marL="0" indent="0">
+              <a:buNone/>
+            </a:pPr>
+            <a:r>
+              <a:rPr lang="en-US" dirty="0"/>
+              <a:t>Twitter: </a:t>
+            </a:r>
+            <a:r>
+              <a:rPr lang="en-US" dirty="0">
+                <a:hlinkClick r:id="rId4"/>
+              </a:rPr>
+              <a:t>@</a:t>
+            </a:r>
+            <a:r>
+              <a:rPr lang="en-US" dirty="0" err="1">
+                <a:hlinkClick r:id="rId4"/>
+              </a:rPr>
+              <a:t>sjkilleen</a:t>
+            </a:r>
+            <a:endParaRPr lang="en-US" dirty="0"/>
+          </a:p>
+          <a:p>
+            <a:pPr marL="0" indent="0">
+              <a:buNone/>
+            </a:pPr>
+            <a:r>
+              <a:rPr lang="en-US" dirty="0" err="1"/>
+              <a:t>Github</a:t>
+            </a:r>
+            <a:r>
+              <a:rPr lang="en-US" dirty="0"/>
+              <a:t>: </a:t>
+            </a:r>
+            <a:r>
+              <a:rPr lang="en-US" dirty="0">
+                <a:hlinkClick r:id="rId5"/>
+              </a:rPr>
+              <a:t>@</a:t>
+            </a:r>
+            <a:r>
+              <a:rPr lang="en-US" dirty="0" err="1">
+                <a:hlinkClick r:id="rId5"/>
+              </a:rPr>
+              <a:t>SeanKilleen</a:t>
+            </a:r>
+            <a:endParaRPr lang="en-US" dirty="0"/>
+          </a:p>
+          <a:p>
+            <a:pPr marL="0" indent="0">
+              <a:buNone/>
+            </a:pPr>
+            <a:r>
+              <a:rPr lang="en-US" dirty="0"/>
+              <a:t>E-Mail:</a:t>
+            </a:r>
+          </a:p>
+          <a:p>
+            <a:pPr marL="0" indent="0">
+              <a:buNone/>
+            </a:pPr>
+            <a:r>
+              <a:rPr lang="en-US" dirty="0"/>
+              <a:t>	</a:t>
+            </a:r>
+            <a:r>
+              <a:rPr lang="en-US" dirty="0">
+                <a:hlinkClick r:id="rId6"/>
+              </a:rPr>
+              <a:t>SeanKilleen@gmail.com</a:t>
+            </a:r>
+            <a:endParaRPr lang="en-US" dirty="0"/>
+          </a:p>
+          <a:p>
+            <a:pPr marL="0" indent="0">
+              <a:buNone/>
+            </a:pPr>
+            <a:r>
+              <a:rPr lang="en-US" dirty="0"/>
+              <a:t>	</a:t>
+            </a:r>
+            <a:r>
+              <a:rPr lang="en-US" dirty="0">
+                <a:hlinkClick r:id="rId7"/>
+              </a:rPr>
+              <a:t>sean.killeen@excella.com</a:t>
+            </a:r>
+            <a:r>
+              <a:rPr lang="en-US" dirty="0"/>
+              <a:t> </a:t>
+            </a:r>
+          </a:p>
+          <a:p>
+            <a:pPr marL="0" indent="0">
+              <a:buNone/>
+            </a:pPr>
+            <a:endParaRPr lang="en-US" dirty="0"/>
+          </a:p>
+          <a:p>
+            <a:pPr marL="0" indent="0">
+              <a:buNone/>
+            </a:pPr>
+            <a:r>
+              <a:rPr lang="en-US" dirty="0"/>
+              <a:t>Web: </a:t>
+            </a:r>
+            <a:r>
+              <a:rPr lang="en-US" dirty="0">
+                <a:hlinkClick r:id="rId8"/>
+              </a:rPr>
+              <a:t>http://SeanKilleen.com</a:t>
+            </a:r>
+            <a:endParaRPr lang="en-US" dirty="0"/>
+          </a:p>
+          <a:p>
+            <a:pPr marL="0" indent="0">
+              <a:buNone/>
+            </a:pPr>
+            <a:r>
+              <a:rPr lang="en-US" dirty="0"/>
+              <a:t>            </a:t>
+            </a:r>
+          </a:p>
+          <a:p>
+            <a:pPr marL="0" indent="0">
+              <a:buNone/>
+            </a:pPr>
+            <a:endParaRPr lang="en-US" dirty="0"/>
           </a:p>
         </p:txBody>
       </p:sp>
     </p:spTree>
     <p:extLst>
       <p:ext uri="{BB962C8B-B14F-4D97-AF65-F5344CB8AC3E}">
-        <p14:creationId xmlns:p14="http://schemas.microsoft.com/office/powerpoint/2010/main" val="2555590544"/>
+        <p14:creationId xmlns:p14="http://schemas.microsoft.com/office/powerpoint/2010/main" val="1481883768"/>
       </p:ext>
     </p:extLst>
   </p:cSld>
@@ -42165,6 +42502,58 @@
     <p:extLst>
       <p:ext uri="{BB962C8B-B14F-4D97-AF65-F5344CB8AC3E}">
         <p14:creationId xmlns:p14="http://schemas.microsoft.com/office/powerpoint/2010/main" val="1390811855"/>
+      </p:ext>
+    </p:extLst>
+  </p:cSld>
+  <p:clrMapOvr>
+    <a:masterClrMapping/>
+  </p:clrMapOvr>
+</p:sld>
+</file>
+
+<file path=ppt/slides/slide40.xml><?xml version="1.0" encoding="utf-8"?>
+<p:sld xmlns:a="http://schemas.openxmlformats.org/drawingml/2006/main" xmlns:r="http://schemas.openxmlformats.org/officeDocument/2006/relationships" xmlns:p="http://schemas.openxmlformats.org/presentationml/2006/main">
+  <p:cSld>
+    <p:spTree>
+      <p:nvGrpSpPr>
+        <p:cNvPr id="1" name=""/>
+        <p:cNvGrpSpPr/>
+        <p:nvPr/>
+      </p:nvGrpSpPr>
+      <p:grpSpPr>
+        <a:xfrm>
+          <a:off x="0" y="0"/>
+          <a:ext cx="0" cy="0"/>
+          <a:chOff x="0" y="0"/>
+          <a:chExt cx="0" cy="0"/>
+        </a:xfrm>
+      </p:grpSpPr>
+      <p:sp>
+        <p:nvSpPr>
+          <p:cNvPr id="2" name="Title 1"/>
+          <p:cNvSpPr>
+            <a:spLocks noGrp="1"/>
+          </p:cNvSpPr>
+          <p:nvPr>
+            <p:ph type="title"/>
+          </p:nvPr>
+        </p:nvSpPr>
+        <p:spPr/>
+        <p:txBody>
+          <a:bodyPr/>
+          <a:lstStyle/>
+          <a:p>
+            <a:r>
+              <a:rPr lang="en-US" dirty="0"/>
+              <a:t>Fin.</a:t>
+            </a:r>
+          </a:p>
+        </p:txBody>
+      </p:sp>
+    </p:spTree>
+    <p:extLst>
+      <p:ext uri="{BB962C8B-B14F-4D97-AF65-F5344CB8AC3E}">
+        <p14:creationId xmlns:p14="http://schemas.microsoft.com/office/powerpoint/2010/main" val="168733025"/>
       </p:ext>
     </p:extLst>
   </p:cSld>

</xml_diff>

<commit_message>
Add date of hewitt white paper
</commit_message>
<xml_diff>
--- a/2016-06_AkkaIntro/presentation/BaltoMSDN_Akka.pptx
+++ b/2016-06_AkkaIntro/presentation/BaltoMSDN_Akka.pptx
@@ -6974,8 +6974,13 @@
             </a:r>
             <a:r>
               <a:rPr lang="en-US" baseline="0" dirty="0"/>
-              <a:t> has been around since the 70s – Carl Hewitt</a:t>
-            </a:r>
+              <a:t> has been around since the 70s – Carl </a:t>
+            </a:r>
+            <a:r>
+              <a:rPr lang="en-US" baseline="0"/>
+              <a:t>Hewitt published in 1973</a:t>
+            </a:r>
+            <a:endParaRPr lang="en-US" baseline="0" dirty="0"/>
           </a:p>
         </p:txBody>
       </p:sp>

</xml_diff>

<commit_message>
Other...changes? I forget haha.
</commit_message>
<xml_diff>
--- a/2016-06_AkkaIntro/presentation/BaltoMSDN_Akka.pptx
+++ b/2016-06_AkkaIntro/presentation/BaltoMSDN_Akka.pptx
@@ -6969,18 +6969,13 @@
           <a:lstStyle/>
           <a:p>
             <a:r>
-              <a:rPr lang="en-US" dirty="0"/>
+              <a:rPr lang="en-US" sz="2000" dirty="0"/>
               <a:t>Actor model</a:t>
             </a:r>
             <a:r>
-              <a:rPr lang="en-US" baseline="0" dirty="0"/>
-              <a:t> has been around since the 70s – Carl </a:t>
-            </a:r>
-            <a:r>
-              <a:rPr lang="en-US" baseline="0"/>
-              <a:t>Hewitt published in 1973</a:t>
-            </a:r>
-            <a:endParaRPr lang="en-US" baseline="0" dirty="0"/>
+              <a:rPr lang="en-US" sz="2000" baseline="0" dirty="0"/>
+              <a:t> has been around since the 70s – Carl Hewitt published in 1973</a:t>
+            </a:r>
           </a:p>
         </p:txBody>
       </p:sp>

</xml_diff>

<commit_message>
shrink last slide pic too
</commit_message>
<xml_diff>
--- a/2016-06_AkkaIntro/presentation/BaltoMSDN_Akka.pptx
+++ b/2016-06_AkkaIntro/presentation/BaltoMSDN_Akka.pptx
@@ -42128,8 +42128,8 @@
         </p:blipFill>
         <p:spPr>
           <a:xfrm>
-            <a:off x="984074" y="1690688"/>
-            <a:ext cx="3768548" cy="3768548"/>
+            <a:off x="2073286" y="2067206"/>
+            <a:ext cx="2787183" cy="2787183"/>
           </a:xfrm>
         </p:spPr>
       </p:pic>
@@ -42842,7 +42842,7 @@
               <a:buNone/>
             </a:pPr>
             <a:r>
-              <a:rPr lang="en-US"/>
+              <a:rPr lang="en-US" dirty="0"/>
               <a:t>“</a:t>
             </a:r>
             <a:r>

</xml_diff>

<commit_message>
intro slide changes / uniformity
</commit_message>
<xml_diff>
--- a/2016-06_AkkaIntro/presentation/BaltoMSDN_Akka.pptx
+++ b/2016-06_AkkaIntro/presentation/BaltoMSDN_Akka.pptx
@@ -13,7 +13,7 @@
     <p:sldId id="261" r:id="rId4"/>
     <p:sldId id="317" r:id="rId5"/>
     <p:sldId id="318" r:id="rId6"/>
-    <p:sldId id="319" r:id="rId7"/>
+    <p:sldId id="324" r:id="rId7"/>
     <p:sldId id="258" r:id="rId8"/>
     <p:sldId id="259" r:id="rId9"/>
     <p:sldId id="260" r:id="rId10"/>
@@ -46,7 +46,7 @@
     <p:sldId id="281" r:id="rId37"/>
     <p:sldId id="313" r:id="rId38"/>
     <p:sldId id="282" r:id="rId39"/>
-    <p:sldId id="320" r:id="rId40"/>
+    <p:sldId id="323" r:id="rId40"/>
     <p:sldId id="321" r:id="rId41"/>
   </p:sldIdLst>
   <p:sldSz cx="12192000" cy="6858000"/>
@@ -6306,7 +6306,7 @@
     </p:spTree>
     <p:extLst>
       <p:ext uri="{BB962C8B-B14F-4D97-AF65-F5344CB8AC3E}">
-        <p14:creationId xmlns:p14="http://schemas.microsoft.com/office/powerpoint/2010/main" val="2935918185"/>
+        <p14:creationId xmlns:p14="http://schemas.microsoft.com/office/powerpoint/2010/main" val="280003003"/>
       </p:ext>
     </p:extLst>
   </p:cSld>
@@ -6826,7 +6826,7 @@
     </p:spTree>
     <p:extLst>
       <p:ext uri="{BB962C8B-B14F-4D97-AF65-F5344CB8AC3E}">
-        <p14:creationId xmlns:p14="http://schemas.microsoft.com/office/powerpoint/2010/main" val="2201549129"/>
+        <p14:creationId xmlns:p14="http://schemas.microsoft.com/office/powerpoint/2010/main" val="3201167027"/>
       </p:ext>
     </p:extLst>
   </p:cSld>
@@ -42105,7 +42105,7 @@
           <a:p>
             <a:r>
               <a:rPr lang="en-US" dirty="0"/>
-              <a:t>Thanks -- Stay in Touch!</a:t>
+              <a:t>Thanks! Stay in Touch.</a:t>
             </a:r>
           </a:p>
         </p:txBody>
@@ -42128,7 +42128,7 @@
         </p:blipFill>
         <p:spPr>
           <a:xfrm>
-            <a:off x="2073286" y="2067206"/>
+            <a:off x="1750557" y="2472765"/>
             <a:ext cx="2787183" cy="2787183"/>
           </a:xfrm>
         </p:spPr>
@@ -42150,8 +42150,38 @@
           </a:xfrm>
         </p:spPr>
         <p:txBody>
-          <a:bodyPr/>
+          <a:bodyPr>
+            <a:normAutofit lnSpcReduction="10000"/>
+          </a:bodyPr>
           <a:lstStyle/>
+          <a:p>
+            <a:pPr marL="0" indent="0">
+              <a:buNone/>
+            </a:pPr>
+            <a:r>
+              <a:rPr lang="en-US" dirty="0"/>
+              <a:t>“</a:t>
+            </a:r>
+            <a:r>
+              <a:rPr lang="en-US" dirty="0" err="1"/>
+              <a:t>Seanior</a:t>
+            </a:r>
+            <a:r>
+              <a:rPr lang="en-US" dirty="0"/>
+              <a:t> Consultant” @ </a:t>
+            </a:r>
+            <a:r>
+              <a:rPr lang="en-US" dirty="0" err="1"/>
+              <a:t>Excella</a:t>
+            </a:r>
+            <a:endParaRPr lang="en-US" dirty="0"/>
+          </a:p>
+          <a:p>
+            <a:pPr marL="0" indent="0">
+              <a:buNone/>
+            </a:pPr>
+            <a:endParaRPr lang="en-US" dirty="0"/>
+          </a:p>
           <a:p>
             <a:pPr marL="0" indent="0">
               <a:buNone/>
@@ -42265,15 +42295,6 @@
               <a:t>http://SeanKilleen.com</a:t>
             </a:r>
             <a:endParaRPr lang="en-US" dirty="0"/>
-          </a:p>
-          <a:p>
-            <a:pPr marL="0" indent="0">
-              <a:buNone/>
-            </a:pPr>
-            <a:r>
-              <a:rPr lang="en-US" dirty="0"/>
-              <a:t>            </a:t>
-            </a:r>
           </a:p>
           <a:p>
             <a:pPr marL="0" indent="0">
@@ -42286,7 +42307,7 @@
     </p:spTree>
     <p:extLst>
       <p:ext uri="{BB962C8B-B14F-4D97-AF65-F5344CB8AC3E}">
-        <p14:creationId xmlns:p14="http://schemas.microsoft.com/office/powerpoint/2010/main" val="1481883768"/>
+        <p14:creationId xmlns:p14="http://schemas.microsoft.com/office/powerpoint/2010/main" val="1874838899"/>
       </p:ext>
     </p:extLst>
   </p:cSld>
@@ -42785,12 +42806,8 @@
           <a:lstStyle/>
           <a:p>
             <a:r>
-              <a:rPr lang="en-US" baseline="0" dirty="0"/>
-              <a:t>Oh, Hey</a:t>
-            </a:r>
-            <a:r>
               <a:rPr lang="en-US" dirty="0"/>
-              <a:t> There! I’m Sean.</a:t>
+              <a:t>Oh Hey There!</a:t>
             </a:r>
           </a:p>
         </p:txBody>
@@ -42813,8 +42830,8 @@
         </p:blipFill>
         <p:spPr>
           <a:xfrm>
-            <a:off x="1898478" y="2047033"/>
-            <a:ext cx="2773736" cy="2773736"/>
+            <a:off x="1750557" y="2472765"/>
+            <a:ext cx="2787183" cy="2787183"/>
           </a:xfrm>
         </p:spPr>
       </p:pic>
@@ -42835,7 +42852,9 @@
           </a:xfrm>
         </p:spPr>
         <p:txBody>
-          <a:bodyPr/>
+          <a:bodyPr>
+            <a:normAutofit lnSpcReduction="10000"/>
+          </a:bodyPr>
           <a:lstStyle/>
           <a:p>
             <a:pPr marL="0" indent="0">
@@ -42851,21 +42870,13 @@
             </a:r>
             <a:r>
               <a:rPr lang="en-US" dirty="0"/>
-              <a:t>” Consultant</a:t>
-            </a:r>
-          </a:p>
-          <a:p>
-            <a:pPr marL="0" indent="0">
-              <a:buNone/>
-            </a:pPr>
+              <a:t> Consultant” @ </a:t>
+            </a:r>
             <a:r>
               <a:rPr lang="en-US" dirty="0" err="1"/>
               <a:t>Excella</a:t>
             </a:r>
-            <a:r>
-              <a:rPr lang="en-US" dirty="0"/>
-              <a:t> Consulting</a:t>
-            </a:r>
+            <a:endParaRPr lang="en-US" dirty="0"/>
           </a:p>
           <a:p>
             <a:pPr marL="0" indent="0">
@@ -42925,7 +42936,10 @@
             <a:pPr marL="0" indent="0">
               <a:buNone/>
             </a:pPr>
-            <a:endParaRPr lang="en-US" dirty="0"/>
+            <a:r>
+              <a:rPr lang="en-US" dirty="0"/>
+              <a:t>E-Mail:</a:t>
+            </a:r>
           </a:p>
           <a:p>
             <a:pPr marL="0" indent="0">
@@ -42933,13 +42947,13 @@
             </a:pPr>
             <a:r>
               <a:rPr lang="en-US" dirty="0"/>
-              <a:t>Web: </a:t>
+              <a:t>	</a:t>
             </a:r>
             <a:r>
               <a:rPr lang="en-US" dirty="0">
                 <a:hlinkClick r:id="rId6"/>
               </a:rPr>
-              <a:t>http://SeanKilleen.com</a:t>
+              <a:t>SeanKilleen@gmail.com</a:t>
             </a:r>
             <a:endParaRPr lang="en-US" dirty="0"/>
           </a:p>
@@ -42949,8 +42963,40 @@
             </a:pPr>
             <a:r>
               <a:rPr lang="en-US" dirty="0"/>
-              <a:t>            </a:t>
-            </a:r>
+              <a:t>	</a:t>
+            </a:r>
+            <a:r>
+              <a:rPr lang="en-US" dirty="0">
+                <a:hlinkClick r:id="rId7"/>
+              </a:rPr>
+              <a:t>sean.killeen@excella.com</a:t>
+            </a:r>
+            <a:r>
+              <a:rPr lang="en-US" dirty="0"/>
+              <a:t> </a:t>
+            </a:r>
+          </a:p>
+          <a:p>
+            <a:pPr marL="0" indent="0">
+              <a:buNone/>
+            </a:pPr>
+            <a:endParaRPr lang="en-US" dirty="0"/>
+          </a:p>
+          <a:p>
+            <a:pPr marL="0" indent="0">
+              <a:buNone/>
+            </a:pPr>
+            <a:r>
+              <a:rPr lang="en-US" dirty="0"/>
+              <a:t>Web: </a:t>
+            </a:r>
+            <a:r>
+              <a:rPr lang="en-US" dirty="0">
+                <a:hlinkClick r:id="rId8"/>
+              </a:rPr>
+              <a:t>http://SeanKilleen.com</a:t>
+            </a:r>
+            <a:endParaRPr lang="en-US" dirty="0"/>
           </a:p>
           <a:p>
             <a:pPr marL="0" indent="0">
@@ -42963,7 +43009,7 @@
     </p:spTree>
     <p:extLst>
       <p:ext uri="{BB962C8B-B14F-4D97-AF65-F5344CB8AC3E}">
-        <p14:creationId xmlns:p14="http://schemas.microsoft.com/office/powerpoint/2010/main" val="3454725157"/>
+        <p14:creationId xmlns:p14="http://schemas.microsoft.com/office/powerpoint/2010/main" val="412168367"/>
       </p:ext>
     </p:extLst>
   </p:cSld>

</xml_diff>